<commit_message>
Added slide on Team City
</commit_message>
<xml_diff>
--- a/Presentations/Intro.pptx
+++ b/Presentations/Intro.pptx
@@ -5,19 +5,20 @@
     <p:sldMasterId id="2147483648" r:id="rId1"/>
   </p:sldMasterIdLst>
   <p:notesMasterIdLst>
-    <p:notesMasterId r:id="rId9"/>
+    <p:notesMasterId r:id="rId10"/>
   </p:notesMasterIdLst>
   <p:handoutMasterIdLst>
-    <p:handoutMasterId r:id="rId10"/>
+    <p:handoutMasterId r:id="rId11"/>
   </p:handoutMasterIdLst>
   <p:sldIdLst>
     <p:sldId id="256" r:id="rId2"/>
     <p:sldId id="257" r:id="rId3"/>
-    <p:sldId id="258" r:id="rId4"/>
-    <p:sldId id="259" r:id="rId5"/>
-    <p:sldId id="260" r:id="rId6"/>
-    <p:sldId id="261" r:id="rId7"/>
-    <p:sldId id="262" r:id="rId8"/>
+    <p:sldId id="263" r:id="rId4"/>
+    <p:sldId id="258" r:id="rId5"/>
+    <p:sldId id="259" r:id="rId6"/>
+    <p:sldId id="260" r:id="rId7"/>
+    <p:sldId id="261" r:id="rId8"/>
+    <p:sldId id="262" r:id="rId9"/>
   </p:sldIdLst>
   <p:sldSz cx="9144000" cy="6858000" type="screen4x3"/>
   <p:notesSz cx="6858000" cy="9144000"/>
@@ -492,7 +493,12 @@
             <p:ph type="sldImg"/>
           </p:nvPr>
         </p:nvSpPr>
-        <p:spPr/>
+        <p:spPr>
+          <a:xfrm>
+            <a:off x="827088" y="592138"/>
+            <a:ext cx="5226050" cy="3919537"/>
+          </a:xfrm>
+        </p:spPr>
       </p:sp>
       <p:sp>
         <p:nvSpPr>
@@ -10029,6 +10035,155 @@
       </p:grpSpPr>
       <p:sp>
         <p:nvSpPr>
+          <p:cNvPr id="6" name="TextBox 5"/>
+          <p:cNvSpPr txBox="1"/>
+          <p:nvPr/>
+        </p:nvSpPr>
+        <p:spPr>
+          <a:xfrm>
+            <a:off x="321623" y="1155876"/>
+            <a:ext cx="8409684" cy="3139321"/>
+          </a:xfrm>
+          <a:prstGeom prst="rect">
+            <a:avLst/>
+          </a:prstGeom>
+          <a:noFill/>
+        </p:spPr>
+        <p:txBody>
+          <a:bodyPr wrap="square" rtlCol="0">
+            <a:spAutoFit/>
+          </a:bodyPr>
+          <a:lstStyle/>
+          <a:p>
+            <a:pPr marL="285750" indent="-285750">
+              <a:buFont typeface="Arial" panose="020B0604020202020204" pitchFamily="34" charset="0"/>
+              <a:buChar char="•"/>
+            </a:pPr>
+            <a:r>
+              <a:rPr lang="nb-NO" sz="1600" dirty="0" smtClean="0"/>
+              <a:t>Byggeverktøy blant annet </a:t>
+            </a:r>
+            <a:r>
+              <a:rPr lang="nb-NO" sz="1600" dirty="0" smtClean="0"/>
+              <a:t>for </a:t>
+            </a:r>
+            <a:r>
+              <a:rPr lang="nb-NO" sz="1600" dirty="0" smtClean="0"/>
+              <a:t>.NET </a:t>
+            </a:r>
+            <a:r>
+              <a:rPr lang="nb-NO" sz="1600" dirty="0" smtClean="0"/>
+              <a:t>løsninger</a:t>
+            </a:r>
+            <a:endParaRPr lang="nb-NO" sz="1600" dirty="0" smtClean="0"/>
+          </a:p>
+          <a:p>
+            <a:pPr marL="285750" indent="-285750">
+              <a:buFont typeface="Arial" panose="020B0604020202020204" pitchFamily="34" charset="0"/>
+              <a:buChar char="•"/>
+            </a:pPr>
+            <a:endParaRPr lang="nb-NO" sz="1600" dirty="0" smtClean="0"/>
+          </a:p>
+          <a:p>
+            <a:pPr marL="285750" indent="-285750">
+              <a:buFont typeface="Arial" panose="020B0604020202020204" pitchFamily="34" charset="0"/>
+              <a:buChar char="•"/>
+            </a:pPr>
+            <a:r>
+              <a:rPr lang="nb-NO" sz="1600" dirty="0" smtClean="0"/>
+              <a:t>Oversikt over ulike bygg gjennom et dashboard</a:t>
+            </a:r>
+            <a:endParaRPr lang="nb-NO" sz="1600" dirty="0"/>
+          </a:p>
+          <a:p>
+            <a:pPr marL="285750" indent="-285750">
+              <a:buFont typeface="Arial" panose="020B0604020202020204" pitchFamily="34" charset="0"/>
+              <a:buChar char="•"/>
+            </a:pPr>
+            <a:endParaRPr lang="nb-NO" sz="1600" dirty="0" smtClean="0"/>
+          </a:p>
+          <a:p>
+            <a:pPr marL="285750" indent="-285750">
+              <a:buFont typeface="Arial" panose="020B0604020202020204" pitchFamily="34" charset="0"/>
+              <a:buChar char="•"/>
+            </a:pPr>
+            <a:r>
+              <a:rPr lang="nb-NO" sz="1600" dirty="0" smtClean="0"/>
+              <a:t>Mulighet for å trigge bygg basert på endringer i repository (f.eks Git)</a:t>
+            </a:r>
+            <a:endParaRPr lang="nb-NO" sz="1600" dirty="0" smtClean="0"/>
+          </a:p>
+          <a:p>
+            <a:pPr marL="285750" indent="-285750">
+              <a:buFont typeface="Arial" panose="020B0604020202020204" pitchFamily="34" charset="0"/>
+              <a:buChar char="•"/>
+            </a:pPr>
+            <a:endParaRPr lang="nb-NO" sz="1600" dirty="0" smtClean="0"/>
+          </a:p>
+          <a:p>
+            <a:pPr marL="285750" indent="-285750">
+              <a:buFont typeface="Arial" panose="020B0604020202020204" pitchFamily="34" charset="0"/>
+              <a:buChar char="•"/>
+            </a:pPr>
+            <a:r>
+              <a:rPr lang="nb-NO" sz="1600" dirty="0" smtClean="0"/>
+              <a:t>Kan kjøre tester som en del av bygg</a:t>
+            </a:r>
+            <a:endParaRPr lang="nb-NO" sz="1600" dirty="0" smtClean="0"/>
+          </a:p>
+          <a:p>
+            <a:pPr marL="285750" indent="-285750">
+              <a:buFont typeface="Arial" panose="020B0604020202020204" pitchFamily="34" charset="0"/>
+              <a:buChar char="•"/>
+            </a:pPr>
+            <a:endParaRPr lang="nb-NO" sz="1600" dirty="0" smtClean="0"/>
+          </a:p>
+          <a:p>
+            <a:pPr marL="285750" indent="-285750">
+              <a:buFont typeface="Arial" panose="020B0604020202020204" pitchFamily="34" charset="0"/>
+              <a:buChar char="•"/>
+            </a:pPr>
+            <a:r>
+              <a:rPr lang="nb-NO" sz="1600" dirty="0" smtClean="0"/>
+              <a:t>Kan benyttes sammen med Octopus for å rulle ut et vellykket bygg</a:t>
+            </a:r>
+            <a:endParaRPr lang="nb-NO" sz="1600" dirty="0" smtClean="0"/>
+          </a:p>
+          <a:p>
+            <a:endParaRPr lang="nb-NO" sz="1600" dirty="0"/>
+          </a:p>
+          <a:p>
+            <a:pPr marL="285750" indent="-285750">
+              <a:buFont typeface="Arial" panose="020B0604020202020204" pitchFamily="34" charset="0"/>
+              <a:buChar char="•"/>
+            </a:pPr>
+            <a:r>
+              <a:rPr lang="nb-NO" sz="1600" dirty="0" smtClean="0"/>
+              <a:t>Mer info på </a:t>
+            </a:r>
+            <a:r>
+              <a:rPr lang="nb-NO" sz="1600" dirty="0">
+                <a:hlinkClick r:id="rId2"/>
+              </a:rPr>
+              <a:t>http://www.jetbrains.com/teamcity/</a:t>
+            </a:r>
+            <a:endParaRPr lang="nb-NO" sz="1600" dirty="0"/>
+          </a:p>
+          <a:p>
+            <a:pPr>
+              <a:spcBef>
+                <a:spcPts val="600"/>
+              </a:spcBef>
+              <a:spcAft>
+                <a:spcPts val="400"/>
+              </a:spcAft>
+            </a:pPr>
+            <a:endParaRPr lang="nb-NO" sz="1700" dirty="0" err="1" smtClean="0"/>
+          </a:p>
+        </p:txBody>
+      </p:sp>
+      <p:sp>
+        <p:nvSpPr>
           <p:cNvPr id="2" name="Title 1"/>
           <p:cNvSpPr>
             <a:spLocks noGrp="1"/>
@@ -10040,7 +10195,7 @@
         <p:spPr>
           <a:xfrm>
             <a:off x="321623" y="418905"/>
-            <a:ext cx="1396857" cy="307777"/>
+            <a:ext cx="1586332" cy="307777"/>
           </a:xfrm>
         </p:spPr>
         <p:txBody>
@@ -10049,7 +10204,7 @@
           <a:p>
             <a:r>
               <a:rPr lang="nb-NO" dirty="0" smtClean="0"/>
-              <a:t>Octopus</a:t>
+              <a:t>Team city</a:t>
             </a:r>
             <a:endParaRPr lang="nb-NO" dirty="0"/>
           </a:p>
@@ -10079,172 +10234,9 @@
           </a:p>
         </p:txBody>
       </p:sp>
-      <p:sp>
-        <p:nvSpPr>
-          <p:cNvPr id="5" name="TextBox 4"/>
-          <p:cNvSpPr txBox="1"/>
-          <p:nvPr/>
-        </p:nvSpPr>
-        <p:spPr>
-          <a:xfrm>
-            <a:off x="321623" y="1155876"/>
-            <a:ext cx="8409684" cy="3877985"/>
-          </a:xfrm>
-          <a:prstGeom prst="rect">
-            <a:avLst/>
-          </a:prstGeom>
-          <a:noFill/>
-        </p:spPr>
-        <p:txBody>
-          <a:bodyPr wrap="square" rtlCol="0">
-            <a:spAutoFit/>
-          </a:bodyPr>
-          <a:lstStyle/>
-          <a:p>
-            <a:pPr marL="285750" indent="-285750">
-              <a:buFont typeface="Arial" panose="020B0604020202020204" pitchFamily="34" charset="0"/>
-              <a:buChar char="•"/>
-            </a:pPr>
-            <a:r>
-              <a:rPr lang="nb-NO" sz="1600" dirty="0" smtClean="0"/>
-              <a:t>Utrullingsverktøy for .NET utviklere</a:t>
-            </a:r>
-          </a:p>
-          <a:p>
-            <a:pPr marL="285750" indent="-285750">
-              <a:buFont typeface="Arial" panose="020B0604020202020204" pitchFamily="34" charset="0"/>
-              <a:buChar char="•"/>
-            </a:pPr>
-            <a:endParaRPr lang="nb-NO" sz="1600" dirty="0" smtClean="0"/>
-          </a:p>
-          <a:p>
-            <a:pPr marL="285750" indent="-285750">
-              <a:buFont typeface="Arial" panose="020B0604020202020204" pitchFamily="34" charset="0"/>
-              <a:buChar char="•"/>
-            </a:pPr>
-            <a:r>
-              <a:rPr lang="nb-NO" sz="1600" dirty="0" smtClean="0"/>
-              <a:t>Oversikt over ulike miljøer gjennom et dashboard</a:t>
-            </a:r>
-          </a:p>
-          <a:p>
-            <a:pPr marL="285750" indent="-285750">
-              <a:buFont typeface="Arial" panose="020B0604020202020204" pitchFamily="34" charset="0"/>
-              <a:buChar char="•"/>
-            </a:pPr>
-            <a:endParaRPr lang="nb-NO" sz="1600" dirty="0" smtClean="0"/>
-          </a:p>
-          <a:p>
-            <a:pPr marL="285750" indent="-285750">
-              <a:buFont typeface="Arial" panose="020B0604020202020204" pitchFamily="34" charset="0"/>
-              <a:buChar char="•"/>
-            </a:pPr>
-            <a:r>
-              <a:rPr lang="nb-NO" sz="1600" dirty="0" smtClean="0"/>
-              <a:t>Mulighet for å definere ulike variabler for hvert miljø</a:t>
-            </a:r>
-          </a:p>
-          <a:p>
-            <a:pPr marL="285750" indent="-285750">
-              <a:buFont typeface="Arial" panose="020B0604020202020204" pitchFamily="34" charset="0"/>
-              <a:buChar char="•"/>
-            </a:pPr>
-            <a:endParaRPr lang="nb-NO" sz="1600" dirty="0" smtClean="0"/>
-          </a:p>
-          <a:p>
-            <a:pPr marL="285750" indent="-285750">
-              <a:buFont typeface="Arial" panose="020B0604020202020204" pitchFamily="34" charset="0"/>
-              <a:buChar char="•"/>
-            </a:pPr>
-            <a:r>
-              <a:rPr lang="nb-NO" sz="1600" dirty="0" smtClean="0"/>
-              <a:t>Kan utføre .NET Web transformations på alle *.config filer</a:t>
-            </a:r>
-          </a:p>
-          <a:p>
-            <a:pPr marL="285750" indent="-285750">
-              <a:buFont typeface="Arial" panose="020B0604020202020204" pitchFamily="34" charset="0"/>
-              <a:buChar char="•"/>
-            </a:pPr>
-            <a:endParaRPr lang="nb-NO" sz="1600" dirty="0" smtClean="0"/>
-          </a:p>
-          <a:p>
-            <a:pPr marL="285750" indent="-285750">
-              <a:buFont typeface="Arial" panose="020B0604020202020204" pitchFamily="34" charset="0"/>
-              <a:buChar char="•"/>
-            </a:pPr>
-            <a:r>
-              <a:rPr lang="nb-NO" sz="1600" dirty="0" smtClean="0"/>
-              <a:t>Koden som skal rulles ut pakkes i en NuGet pakke</a:t>
-            </a:r>
-          </a:p>
-          <a:p>
-            <a:pPr marL="285750" indent="-285750">
-              <a:buFont typeface="Arial" panose="020B0604020202020204" pitchFamily="34" charset="0"/>
-              <a:buChar char="•"/>
-            </a:pPr>
-            <a:endParaRPr lang="nb-NO" sz="1600" dirty="0"/>
-          </a:p>
-          <a:p>
-            <a:pPr marL="285750" indent="-285750">
-              <a:buFont typeface="Arial" panose="020B0604020202020204" pitchFamily="34" charset="0"/>
-              <a:buChar char="•"/>
-            </a:pPr>
-            <a:r>
-              <a:rPr lang="nb-NO" sz="1600" dirty="0" smtClean="0"/>
-              <a:t>Gratis for ett prosjekt</a:t>
-            </a:r>
-          </a:p>
-          <a:p>
-            <a:pPr marL="285750" indent="-285750">
-              <a:buFont typeface="Arial" panose="020B0604020202020204" pitchFamily="34" charset="0"/>
-              <a:buChar char="•"/>
-            </a:pPr>
-            <a:endParaRPr lang="nb-NO" sz="1600" dirty="0"/>
-          </a:p>
-          <a:p>
-            <a:pPr marL="285750" indent="-285750">
-              <a:buFont typeface="Arial" panose="020B0604020202020204" pitchFamily="34" charset="0"/>
-              <a:buChar char="•"/>
-            </a:pPr>
-            <a:r>
-              <a:rPr lang="nb-NO" sz="1600" dirty="0" smtClean="0"/>
-              <a:t>Mer info på </a:t>
-            </a:r>
-            <a:r>
-              <a:rPr lang="nb-NO" sz="1600" dirty="0" smtClean="0">
-                <a:hlinkClick r:id="rId2"/>
-              </a:rPr>
-              <a:t>http://octopusdeploy.com</a:t>
-            </a:r>
-            <a:r>
-              <a:rPr lang="nb-NO" sz="1600" dirty="0" smtClean="0"/>
-              <a:t> </a:t>
-            </a:r>
-          </a:p>
-          <a:p>
-            <a:pPr marL="285750" indent="-285750">
-              <a:buFont typeface="Arial" panose="020B0604020202020204" pitchFamily="34" charset="0"/>
-              <a:buChar char="•"/>
-            </a:pPr>
-            <a:endParaRPr lang="nb-NO" sz="1600" dirty="0"/>
-          </a:p>
-          <a:p>
-            <a:pPr>
-              <a:spcBef>
-                <a:spcPts val="600"/>
-              </a:spcBef>
-              <a:spcAft>
-                <a:spcPts val="400"/>
-              </a:spcAft>
-            </a:pPr>
-            <a:endParaRPr lang="nb-NO" sz="1700" dirty="0" err="1" smtClean="0"/>
-          </a:p>
-        </p:txBody>
-      </p:sp>
       <p:pic>
         <p:nvPicPr>
-          <p:cNvPr id="6" name="Picture 5"/>
+          <p:cNvPr id="5" name="Picture 4"/>
           <p:cNvPicPr>
             <a:picLocks noChangeAspect="1"/>
           </p:cNvPicPr>
@@ -10258,8 +10250,8 @@
         </p:blipFill>
         <p:spPr>
           <a:xfrm>
-            <a:off x="6538500" y="1137324"/>
-            <a:ext cx="1885950" cy="419100"/>
+            <a:off x="6734287" y="940734"/>
+            <a:ext cx="1997020" cy="500782"/>
           </a:xfrm>
           <a:prstGeom prst="rect">
             <a:avLst/>
@@ -10269,7 +10261,7 @@
     </p:spTree>
     <p:extLst>
       <p:ext uri="{BB962C8B-B14F-4D97-AF65-F5344CB8AC3E}">
-        <p14:creationId xmlns:p14="http://schemas.microsoft.com/office/powerpoint/2010/main" val="3935631651"/>
+        <p14:creationId xmlns:p14="http://schemas.microsoft.com/office/powerpoint/2010/main" val="3451734592"/>
       </p:ext>
     </p:extLst>
   </p:cSld>
@@ -10279,13 +10271,6 @@
   <p:transition>
     <p:fade thruBlk="1"/>
   </p:transition>
-  <p:timing>
-    <p:tnLst>
-      <p:par>
-        <p:cTn id="1" dur="indefinite" restart="never" nodeType="tmRoot"/>
-      </p:par>
-    </p:tnLst>
-  </p:timing>
 </p:sld>
 </file>
 
@@ -10319,7 +10304,7 @@
         <p:spPr>
           <a:xfrm>
             <a:off x="321623" y="418905"/>
-            <a:ext cx="2370201" cy="307777"/>
+            <a:ext cx="1396857" cy="307777"/>
           </a:xfrm>
         </p:spPr>
         <p:txBody>
@@ -10328,7 +10313,7 @@
           <a:p>
             <a:r>
               <a:rPr lang="nb-NO" dirty="0" smtClean="0"/>
-              <a:t>Octopus forts.</a:t>
+              <a:t>Octopus</a:t>
             </a:r>
             <a:endParaRPr lang="nb-NO" dirty="0"/>
           </a:p>
@@ -10360,14 +10345,14 @@
       </p:sp>
       <p:sp>
         <p:nvSpPr>
-          <p:cNvPr id="13" name="TextBox 12"/>
+          <p:cNvPr id="5" name="TextBox 4"/>
           <p:cNvSpPr txBox="1"/>
           <p:nvPr/>
         </p:nvSpPr>
         <p:spPr>
           <a:xfrm>
             <a:off x="321623" y="1155876"/>
-            <a:ext cx="8409684" cy="1661993"/>
+            <a:ext cx="8409684" cy="3877985"/>
           </a:xfrm>
           <a:prstGeom prst="rect">
             <a:avLst/>
@@ -10380,22 +10365,13 @@
           </a:bodyPr>
           <a:lstStyle/>
           <a:p>
-            <a:r>
-              <a:rPr lang="nb-NO" sz="1600" b="1" dirty="0" smtClean="0"/>
-              <a:t>Installasjon</a:t>
-            </a:r>
-          </a:p>
-          <a:p>
-            <a:endParaRPr lang="nb-NO" sz="1600" dirty="0" smtClean="0"/>
-          </a:p>
-          <a:p>
             <a:pPr marL="285750" indent="-285750">
               <a:buFont typeface="Arial" panose="020B0604020202020204" pitchFamily="34" charset="0"/>
               <a:buChar char="•"/>
             </a:pPr>
             <a:r>
               <a:rPr lang="nb-NO" sz="1600" dirty="0" smtClean="0"/>
-              <a:t>Èn Octopus-server</a:t>
+              <a:t>Utrullingsverktøy for .NET utviklere</a:t>
             </a:r>
           </a:p>
           <a:p>
@@ -10412,16 +10388,109 @@
             </a:pPr>
             <a:r>
               <a:rPr lang="nb-NO" sz="1600" dirty="0" smtClean="0"/>
-              <a:t>Èn tentacle for </a:t>
-            </a:r>
-            <a:r>
-              <a:rPr lang="nb-NO" sz="1600" i="1" dirty="0" smtClean="0"/>
-              <a:t>hvert</a:t>
-            </a:r>
+              <a:t>Oversikt over ulike miljøer gjennom et dashboard</a:t>
+            </a:r>
+          </a:p>
+          <a:p>
+            <a:pPr marL="285750" indent="-285750">
+              <a:buFont typeface="Arial" panose="020B0604020202020204" pitchFamily="34" charset="0"/>
+              <a:buChar char="•"/>
+            </a:pPr>
+            <a:endParaRPr lang="nb-NO" sz="1600" dirty="0" smtClean="0"/>
+          </a:p>
+          <a:p>
+            <a:pPr marL="285750" indent="-285750">
+              <a:buFont typeface="Arial" panose="020B0604020202020204" pitchFamily="34" charset="0"/>
+              <a:buChar char="•"/>
+            </a:pPr>
             <a:r>
               <a:rPr lang="nb-NO" sz="1600" dirty="0" smtClean="0"/>
-              <a:t> miljø</a:t>
-            </a:r>
+              <a:t>Mulighet for å definere ulike variabler for hvert miljø</a:t>
+            </a:r>
+          </a:p>
+          <a:p>
+            <a:pPr marL="285750" indent="-285750">
+              <a:buFont typeface="Arial" panose="020B0604020202020204" pitchFamily="34" charset="0"/>
+              <a:buChar char="•"/>
+            </a:pPr>
+            <a:endParaRPr lang="nb-NO" sz="1600" dirty="0" smtClean="0"/>
+          </a:p>
+          <a:p>
+            <a:pPr marL="285750" indent="-285750">
+              <a:buFont typeface="Arial" panose="020B0604020202020204" pitchFamily="34" charset="0"/>
+              <a:buChar char="•"/>
+            </a:pPr>
+            <a:r>
+              <a:rPr lang="nb-NO" sz="1600" dirty="0" smtClean="0"/>
+              <a:t>Kan utføre .NET Web transformations på alle *.config filer</a:t>
+            </a:r>
+          </a:p>
+          <a:p>
+            <a:pPr marL="285750" indent="-285750">
+              <a:buFont typeface="Arial" panose="020B0604020202020204" pitchFamily="34" charset="0"/>
+              <a:buChar char="•"/>
+            </a:pPr>
+            <a:endParaRPr lang="nb-NO" sz="1600" dirty="0" smtClean="0"/>
+          </a:p>
+          <a:p>
+            <a:pPr marL="285750" indent="-285750">
+              <a:buFont typeface="Arial" panose="020B0604020202020204" pitchFamily="34" charset="0"/>
+              <a:buChar char="•"/>
+            </a:pPr>
+            <a:r>
+              <a:rPr lang="nb-NO" sz="1600" dirty="0" smtClean="0"/>
+              <a:t>Koden som skal rulles ut pakkes i en NuGet pakke</a:t>
+            </a:r>
+          </a:p>
+          <a:p>
+            <a:pPr marL="285750" indent="-285750">
+              <a:buFont typeface="Arial" panose="020B0604020202020204" pitchFamily="34" charset="0"/>
+              <a:buChar char="•"/>
+            </a:pPr>
+            <a:endParaRPr lang="nb-NO" sz="1600" dirty="0"/>
+          </a:p>
+          <a:p>
+            <a:pPr marL="285750" indent="-285750">
+              <a:buFont typeface="Arial" panose="020B0604020202020204" pitchFamily="34" charset="0"/>
+              <a:buChar char="•"/>
+            </a:pPr>
+            <a:r>
+              <a:rPr lang="nb-NO" sz="1600" dirty="0" smtClean="0"/>
+              <a:t>Gratis for ett prosjekt</a:t>
+            </a:r>
+          </a:p>
+          <a:p>
+            <a:pPr marL="285750" indent="-285750">
+              <a:buFont typeface="Arial" panose="020B0604020202020204" pitchFamily="34" charset="0"/>
+              <a:buChar char="•"/>
+            </a:pPr>
+            <a:endParaRPr lang="nb-NO" sz="1600" dirty="0"/>
+          </a:p>
+          <a:p>
+            <a:pPr marL="285750" indent="-285750">
+              <a:buFont typeface="Arial" panose="020B0604020202020204" pitchFamily="34" charset="0"/>
+              <a:buChar char="•"/>
+            </a:pPr>
+            <a:r>
+              <a:rPr lang="nb-NO" sz="1600" dirty="0" smtClean="0"/>
+              <a:t>Mer info på </a:t>
+            </a:r>
+            <a:r>
+              <a:rPr lang="nb-NO" sz="1600" dirty="0" smtClean="0">
+                <a:hlinkClick r:id="rId2"/>
+              </a:rPr>
+              <a:t>http://octopusdeploy.com</a:t>
+            </a:r>
+            <a:r>
+              <a:rPr lang="nb-NO" sz="1600" dirty="0" smtClean="0"/>
+              <a:t> </a:t>
+            </a:r>
+          </a:p>
+          <a:p>
+            <a:pPr marL="285750" indent="-285750">
+              <a:buFont typeface="Arial" panose="020B0604020202020204" pitchFamily="34" charset="0"/>
+              <a:buChar char="•"/>
+            </a:pPr>
             <a:endParaRPr lang="nb-NO" sz="1600" dirty="0"/>
           </a:p>
           <a:p>
@@ -10439,22 +10508,22 @@
       </p:sp>
       <p:pic>
         <p:nvPicPr>
-          <p:cNvPr id="15" name="Picture 14"/>
+          <p:cNvPr id="6" name="Picture 5"/>
           <p:cNvPicPr>
             <a:picLocks noChangeAspect="1"/>
           </p:cNvPicPr>
           <p:nvPr/>
         </p:nvPicPr>
         <p:blipFill>
-          <a:blip r:embed="rId2"/>
+          <a:blip r:embed="rId3"/>
           <a:stretch>
             <a:fillRect/>
           </a:stretch>
         </p:blipFill>
         <p:spPr>
           <a:xfrm>
-            <a:off x="4516131" y="1536379"/>
-            <a:ext cx="3908319" cy="3784337"/>
+            <a:off x="6538500" y="1137324"/>
+            <a:ext cx="1885950" cy="419100"/>
           </a:xfrm>
           <a:prstGeom prst="rect">
             <a:avLst/>
@@ -10464,7 +10533,7 @@
     </p:spTree>
     <p:extLst>
       <p:ext uri="{BB962C8B-B14F-4D97-AF65-F5344CB8AC3E}">
-        <p14:creationId xmlns:p14="http://schemas.microsoft.com/office/powerpoint/2010/main" val="3478593876"/>
+        <p14:creationId xmlns:p14="http://schemas.microsoft.com/office/powerpoint/2010/main" val="3935631651"/>
       </p:ext>
     </p:extLst>
   </p:cSld>
@@ -10514,7 +10583,7 @@
         <p:spPr>
           <a:xfrm>
             <a:off x="321623" y="418905"/>
-            <a:ext cx="3264676" cy="307777"/>
+            <a:ext cx="2370201" cy="307777"/>
           </a:xfrm>
         </p:spPr>
         <p:txBody>
@@ -10523,7 +10592,7 @@
           <a:p>
             <a:r>
               <a:rPr lang="nb-NO" dirty="0" smtClean="0"/>
-              <a:t>Octopus - Dashboard</a:t>
+              <a:t>Octopus forts.</a:t>
             </a:r>
             <a:endParaRPr lang="nb-NO" dirty="0"/>
           </a:p>
@@ -10548,6 +10617,201 @@
               <a:rPr lang="en-US" smtClean="0"/>
               <a:pPr/>
               <a:t>5</a:t>
+            </a:fld>
+            <a:endParaRPr lang="en-US" dirty="0"/>
+          </a:p>
+        </p:txBody>
+      </p:sp>
+      <p:sp>
+        <p:nvSpPr>
+          <p:cNvPr id="13" name="TextBox 12"/>
+          <p:cNvSpPr txBox="1"/>
+          <p:nvPr/>
+        </p:nvSpPr>
+        <p:spPr>
+          <a:xfrm>
+            <a:off x="321623" y="1155876"/>
+            <a:ext cx="8409684" cy="1661993"/>
+          </a:xfrm>
+          <a:prstGeom prst="rect">
+            <a:avLst/>
+          </a:prstGeom>
+          <a:noFill/>
+        </p:spPr>
+        <p:txBody>
+          <a:bodyPr wrap="square" rtlCol="0">
+            <a:spAutoFit/>
+          </a:bodyPr>
+          <a:lstStyle/>
+          <a:p>
+            <a:r>
+              <a:rPr lang="nb-NO" sz="1600" b="1" dirty="0" smtClean="0"/>
+              <a:t>Installasjon</a:t>
+            </a:r>
+          </a:p>
+          <a:p>
+            <a:endParaRPr lang="nb-NO" sz="1600" dirty="0" smtClean="0"/>
+          </a:p>
+          <a:p>
+            <a:pPr marL="285750" indent="-285750">
+              <a:buFont typeface="Arial" panose="020B0604020202020204" pitchFamily="34" charset="0"/>
+              <a:buChar char="•"/>
+            </a:pPr>
+            <a:r>
+              <a:rPr lang="nb-NO" sz="1600" dirty="0" smtClean="0"/>
+              <a:t>Èn Octopus-server</a:t>
+            </a:r>
+          </a:p>
+          <a:p>
+            <a:pPr marL="285750" indent="-285750">
+              <a:buFont typeface="Arial" panose="020B0604020202020204" pitchFamily="34" charset="0"/>
+              <a:buChar char="•"/>
+            </a:pPr>
+            <a:endParaRPr lang="nb-NO" sz="1600" dirty="0" smtClean="0"/>
+          </a:p>
+          <a:p>
+            <a:pPr marL="285750" indent="-285750">
+              <a:buFont typeface="Arial" panose="020B0604020202020204" pitchFamily="34" charset="0"/>
+              <a:buChar char="•"/>
+            </a:pPr>
+            <a:r>
+              <a:rPr lang="nb-NO" sz="1600" dirty="0" smtClean="0"/>
+              <a:t>Èn tentacle for </a:t>
+            </a:r>
+            <a:r>
+              <a:rPr lang="nb-NO" sz="1600" i="1" dirty="0" smtClean="0"/>
+              <a:t>hvert</a:t>
+            </a:r>
+            <a:r>
+              <a:rPr lang="nb-NO" sz="1600" dirty="0" smtClean="0"/>
+              <a:t> miljø</a:t>
+            </a:r>
+            <a:endParaRPr lang="nb-NO" sz="1600" dirty="0"/>
+          </a:p>
+          <a:p>
+            <a:pPr>
+              <a:spcBef>
+                <a:spcPts val="600"/>
+              </a:spcBef>
+              <a:spcAft>
+                <a:spcPts val="400"/>
+              </a:spcAft>
+            </a:pPr>
+            <a:endParaRPr lang="nb-NO" sz="1700" dirty="0" err="1" smtClean="0"/>
+          </a:p>
+        </p:txBody>
+      </p:sp>
+      <p:pic>
+        <p:nvPicPr>
+          <p:cNvPr id="15" name="Picture 14"/>
+          <p:cNvPicPr>
+            <a:picLocks noChangeAspect="1"/>
+          </p:cNvPicPr>
+          <p:nvPr/>
+        </p:nvPicPr>
+        <p:blipFill>
+          <a:blip r:embed="rId2"/>
+          <a:stretch>
+            <a:fillRect/>
+          </a:stretch>
+        </p:blipFill>
+        <p:spPr>
+          <a:xfrm>
+            <a:off x="4516131" y="1536379"/>
+            <a:ext cx="3908319" cy="3784337"/>
+          </a:xfrm>
+          <a:prstGeom prst="rect">
+            <a:avLst/>
+          </a:prstGeom>
+        </p:spPr>
+      </p:pic>
+    </p:spTree>
+    <p:extLst>
+      <p:ext uri="{BB962C8B-B14F-4D97-AF65-F5344CB8AC3E}">
+        <p14:creationId xmlns:p14="http://schemas.microsoft.com/office/powerpoint/2010/main" val="3478593876"/>
+      </p:ext>
+    </p:extLst>
+  </p:cSld>
+  <p:clrMapOvr>
+    <a:masterClrMapping/>
+  </p:clrMapOvr>
+  <p:transition>
+    <p:fade thruBlk="1"/>
+  </p:transition>
+  <p:timing>
+    <p:tnLst>
+      <p:par>
+        <p:cTn id="1" dur="indefinite" restart="never" nodeType="tmRoot"/>
+      </p:par>
+    </p:tnLst>
+  </p:timing>
+</p:sld>
+</file>
+
+<file path=ppt/slides/slide6.xml><?xml version="1.0" encoding="utf-8"?>
+<p:sld xmlns:a="http://schemas.openxmlformats.org/drawingml/2006/main" xmlns:r="http://schemas.openxmlformats.org/officeDocument/2006/relationships" xmlns:p="http://schemas.openxmlformats.org/presentationml/2006/main">
+  <p:cSld>
+    <p:spTree>
+      <p:nvGrpSpPr>
+        <p:cNvPr id="1" name=""/>
+        <p:cNvGrpSpPr/>
+        <p:nvPr/>
+      </p:nvGrpSpPr>
+      <p:grpSpPr>
+        <a:xfrm>
+          <a:off x="0" y="0"/>
+          <a:ext cx="0" cy="0"/>
+          <a:chOff x="0" y="0"/>
+          <a:chExt cx="0" cy="0"/>
+        </a:xfrm>
+      </p:grpSpPr>
+      <p:sp>
+        <p:nvSpPr>
+          <p:cNvPr id="2" name="Title 1"/>
+          <p:cNvSpPr>
+            <a:spLocks noGrp="1"/>
+          </p:cNvSpPr>
+          <p:nvPr>
+            <p:ph type="title"/>
+          </p:nvPr>
+        </p:nvSpPr>
+        <p:spPr>
+          <a:xfrm>
+            <a:off x="321623" y="418905"/>
+            <a:ext cx="3264676" cy="307777"/>
+          </a:xfrm>
+        </p:spPr>
+        <p:txBody>
+          <a:bodyPr/>
+          <a:lstStyle/>
+          <a:p>
+            <a:r>
+              <a:rPr lang="nb-NO" dirty="0" smtClean="0"/>
+              <a:t>Octopus - Dashboard</a:t>
+            </a:r>
+            <a:endParaRPr lang="nb-NO" dirty="0"/>
+          </a:p>
+        </p:txBody>
+      </p:sp>
+      <p:sp>
+        <p:nvSpPr>
+          <p:cNvPr id="3" name="Slide Number Placeholder 2"/>
+          <p:cNvSpPr>
+            <a:spLocks noGrp="1"/>
+          </p:cNvSpPr>
+          <p:nvPr>
+            <p:ph type="sldNum" sz="quarter" idx="10"/>
+          </p:nvPr>
+        </p:nvSpPr>
+        <p:spPr/>
+        <p:txBody>
+          <a:bodyPr/>
+          <a:lstStyle/>
+          <a:p>
+            <a:fld id="{FF67BF5B-7344-D747-A0C2-CBD7B2ACBC85}" type="slidenum">
+              <a:rPr lang="en-US" smtClean="0"/>
+              <a:pPr/>
+              <a:t>6</a:t>
             </a:fld>
             <a:endParaRPr lang="en-US" dirty="0"/>
           </a:p>
@@ -10610,7 +10874,7 @@
 </p:sld>
 </file>
 
-<file path=ppt/slides/slide6.xml><?xml version="1.0" encoding="utf-8"?>
+<file path=ppt/slides/slide7.xml><?xml version="1.0" encoding="utf-8"?>
 <p:sld xmlns:a="http://schemas.openxmlformats.org/drawingml/2006/main" xmlns:r="http://schemas.openxmlformats.org/officeDocument/2006/relationships" xmlns:p="http://schemas.openxmlformats.org/presentationml/2006/main">
   <p:cSld>
     <p:spTree>
@@ -10736,7 +11000,7 @@
             <a:fld id="{FF67BF5B-7344-D747-A0C2-CBD7B2ACBC85}" type="slidenum">
               <a:rPr lang="en-US" smtClean="0"/>
               <a:pPr/>
-              <a:t>6</a:t>
+              <a:t>7</a:t>
             </a:fld>
             <a:endParaRPr lang="en-US" dirty="0"/>
           </a:p>
@@ -11576,7 +11840,7 @@
 </p:sld>
 </file>
 
-<file path=ppt/slides/slide7.xml><?xml version="1.0" encoding="utf-8"?>
+<file path=ppt/slides/slide8.xml><?xml version="1.0" encoding="utf-8"?>
 <p:sld xmlns:a="http://schemas.openxmlformats.org/drawingml/2006/main" xmlns:r="http://schemas.openxmlformats.org/officeDocument/2006/relationships" xmlns:p="http://schemas.openxmlformats.org/presentationml/2006/main">
   <p:cSld>
     <p:spTree>
@@ -11639,7 +11903,7 @@
             <a:fld id="{FF67BF5B-7344-D747-A0C2-CBD7B2ACBC85}" type="slidenum">
               <a:rPr lang="en-US" smtClean="0"/>
               <a:pPr/>
-              <a:t>7</a:t>
+              <a:t>8</a:t>
             </a:fld>
             <a:endParaRPr lang="en-US" dirty="0"/>
           </a:p>

</xml_diff>

<commit_message>
Added slide with url to exercises
</commit_message>
<xml_diff>
--- a/Presentations/Intro.pptx
+++ b/Presentations/Intro.pptx
@@ -5,10 +5,10 @@
     <p:sldMasterId id="2147483648" r:id="rId1"/>
   </p:sldMasterIdLst>
   <p:notesMasterIdLst>
-    <p:notesMasterId r:id="rId10"/>
+    <p:notesMasterId r:id="rId11"/>
   </p:notesMasterIdLst>
   <p:handoutMasterIdLst>
-    <p:handoutMasterId r:id="rId11"/>
+    <p:handoutMasterId r:id="rId12"/>
   </p:handoutMasterIdLst>
   <p:sldIdLst>
     <p:sldId id="256" r:id="rId2"/>
@@ -19,6 +19,7 @@
     <p:sldId id="260" r:id="rId7"/>
     <p:sldId id="261" r:id="rId8"/>
     <p:sldId id="262" r:id="rId9"/>
+    <p:sldId id="264" r:id="rId10"/>
   </p:sldIdLst>
   <p:sldSz cx="9144000" cy="6858000" type="screen4x3"/>
   <p:notesSz cx="6858000" cy="9144000"/>
@@ -10061,21 +10062,8 @@
             </a:pPr>
             <a:r>
               <a:rPr lang="nb-NO" sz="1600" dirty="0" smtClean="0"/>
-              <a:t>Byggeverktøy blant annet </a:t>
-            </a:r>
-            <a:r>
-              <a:rPr lang="nb-NO" sz="1600" dirty="0" smtClean="0"/>
-              <a:t>for </a:t>
-            </a:r>
-            <a:r>
-              <a:rPr lang="nb-NO" sz="1600" dirty="0" smtClean="0"/>
-              <a:t>.NET </a:t>
-            </a:r>
-            <a:r>
-              <a:rPr lang="nb-NO" sz="1600" dirty="0" smtClean="0"/>
-              <a:t>løsninger</a:t>
-            </a:r>
-            <a:endParaRPr lang="nb-NO" sz="1600" dirty="0" smtClean="0"/>
+              <a:t>Byggeverktøy blant annet for .NET løsninger</a:t>
+            </a:r>
           </a:p>
           <a:p>
             <a:pPr marL="285750" indent="-285750">
@@ -10111,7 +10099,6 @@
               <a:rPr lang="nb-NO" sz="1600" dirty="0" smtClean="0"/>
               <a:t>Mulighet for å trigge bygg basert på endringer i repository (f.eks Git)</a:t>
             </a:r>
-            <a:endParaRPr lang="nb-NO" sz="1600" dirty="0" smtClean="0"/>
           </a:p>
           <a:p>
             <a:pPr marL="285750" indent="-285750">
@@ -10129,7 +10116,6 @@
               <a:rPr lang="nb-NO" sz="1600" dirty="0" smtClean="0"/>
               <a:t>Kan kjøre tester som en del av bygg</a:t>
             </a:r>
-            <a:endParaRPr lang="nb-NO" sz="1600" dirty="0" smtClean="0"/>
           </a:p>
           <a:p>
             <a:pPr marL="285750" indent="-285750">
@@ -10147,7 +10133,6 @@
               <a:rPr lang="nb-NO" sz="1600" dirty="0" smtClean="0"/>
               <a:t>Kan benyttes sammen med Octopus for å rulle ut et vellykket bygg</a:t>
             </a:r>
-            <a:endParaRPr lang="nb-NO" sz="1600" dirty="0" smtClean="0"/>
           </a:p>
           <a:p>
             <a:endParaRPr lang="nb-NO" sz="1600" dirty="0"/>
@@ -11913,6 +11898,127 @@
     <p:extLst>
       <p:ext uri="{BB962C8B-B14F-4D97-AF65-F5344CB8AC3E}">
         <p14:creationId xmlns:p14="http://schemas.microsoft.com/office/powerpoint/2010/main" val="48643122"/>
+      </p:ext>
+    </p:extLst>
+  </p:cSld>
+  <p:clrMapOvr>
+    <a:masterClrMapping/>
+  </p:clrMapOvr>
+  <p:transition>
+    <p:fade thruBlk="1"/>
+  </p:transition>
+</p:sld>
+</file>
+
+<file path=ppt/slides/slide9.xml><?xml version="1.0" encoding="utf-8"?>
+<p:sld xmlns:a="http://schemas.openxmlformats.org/drawingml/2006/main" xmlns:r="http://schemas.openxmlformats.org/officeDocument/2006/relationships" xmlns:p="http://schemas.openxmlformats.org/presentationml/2006/main">
+  <p:cSld>
+    <p:spTree>
+      <p:nvGrpSpPr>
+        <p:cNvPr id="1" name=""/>
+        <p:cNvGrpSpPr/>
+        <p:nvPr/>
+      </p:nvGrpSpPr>
+      <p:grpSpPr>
+        <a:xfrm>
+          <a:off x="0" y="0"/>
+          <a:ext cx="0" cy="0"/>
+          <a:chOff x="0" y="0"/>
+          <a:chExt cx="0" cy="0"/>
+        </a:xfrm>
+      </p:grpSpPr>
+      <p:sp>
+        <p:nvSpPr>
+          <p:cNvPr id="2" name="Title 1"/>
+          <p:cNvSpPr>
+            <a:spLocks noGrp="1"/>
+          </p:cNvSpPr>
+          <p:nvPr>
+            <p:ph type="title"/>
+          </p:nvPr>
+        </p:nvSpPr>
+        <p:spPr>
+          <a:xfrm>
+            <a:off x="321623" y="418905"/>
+            <a:ext cx="1583767" cy="307777"/>
+          </a:xfrm>
+        </p:spPr>
+        <p:txBody>
+          <a:bodyPr/>
+          <a:lstStyle/>
+          <a:p>
+            <a:r>
+              <a:rPr lang="nb-NO" dirty="0" smtClean="0"/>
+              <a:t>Oppgaver</a:t>
+            </a:r>
+            <a:endParaRPr lang="nb-NO" dirty="0"/>
+          </a:p>
+        </p:txBody>
+      </p:sp>
+      <p:sp>
+        <p:nvSpPr>
+          <p:cNvPr id="3" name="Slide Number Placeholder 2"/>
+          <p:cNvSpPr>
+            <a:spLocks noGrp="1"/>
+          </p:cNvSpPr>
+          <p:nvPr>
+            <p:ph type="sldNum" sz="quarter" idx="10"/>
+          </p:nvPr>
+        </p:nvSpPr>
+        <p:spPr/>
+        <p:txBody>
+          <a:bodyPr/>
+          <a:lstStyle/>
+          <a:p>
+            <a:fld id="{FF67BF5B-7344-D747-A0C2-CBD7B2ACBC85}" type="slidenum">
+              <a:rPr lang="en-US" smtClean="0"/>
+              <a:pPr/>
+              <a:t>9</a:t>
+            </a:fld>
+            <a:endParaRPr lang="en-US" dirty="0"/>
+          </a:p>
+        </p:txBody>
+      </p:sp>
+      <p:sp>
+        <p:nvSpPr>
+          <p:cNvPr id="5" name="Rectangle 4"/>
+          <p:cNvSpPr/>
+          <p:nvPr/>
+        </p:nvSpPr>
+        <p:spPr>
+          <a:xfrm>
+            <a:off x="1675714" y="1899628"/>
+            <a:ext cx="5620449" cy="769441"/>
+          </a:xfrm>
+          <a:prstGeom prst="rect">
+            <a:avLst/>
+          </a:prstGeom>
+        </p:spPr>
+        <p:txBody>
+          <a:bodyPr wrap="none">
+            <a:spAutoFit/>
+          </a:bodyPr>
+          <a:lstStyle/>
+          <a:p>
+            <a:pPr algn="ctr"/>
+            <a:r>
+              <a:rPr lang="nb-NO" sz="4400" dirty="0">
+                <a:hlinkClick r:id="rId2"/>
+              </a:rPr>
+              <a:t>http://bit.ly/1av6Kre</a:t>
+            </a:r>
+            <a:r>
+              <a:rPr lang="nb-NO" sz="4400" dirty="0"/>
+              <a:t> </a:t>
+            </a:r>
+            <a:endParaRPr lang="nb-NO" sz="4400" dirty="0"/>
+          </a:p>
+        </p:txBody>
+      </p:sp>
+    </p:spTree>
+    <p:extLst>
+      <p:ext uri="{BB962C8B-B14F-4D97-AF65-F5344CB8AC3E}">
+        <p14:creationId xmlns:p14="http://schemas.microsoft.com/office/powerpoint/2010/main" val="3250753098"/>
       </p:ext>
     </p:extLst>
   </p:cSld>

</xml_diff>